<commit_message>
Updated figures, add noise to dummy data
</commit_message>
<xml_diff>
--- a/draftfigs/masks_plus.pptx
+++ b/draftfigs/masks_plus.pptx
@@ -243,7 +243,7 @@
           <a:p>
             <a:fld id="{803E3878-CEFB-8C45-A7D1-B2A6D544C41F}" type="datetimeFigureOut">
               <a:rPr lang="en-NL" smtClean="0"/>
-              <a:t>30/07/2021</a:t>
+              <a:t>11/09/2021</a:t>
             </a:fld>
             <a:endParaRPr lang="en-NL"/>
           </a:p>
@@ -413,7 +413,7 @@
           <a:p>
             <a:fld id="{803E3878-CEFB-8C45-A7D1-B2A6D544C41F}" type="datetimeFigureOut">
               <a:rPr lang="en-NL" smtClean="0"/>
-              <a:t>30/07/2021</a:t>
+              <a:t>11/09/2021</a:t>
             </a:fld>
             <a:endParaRPr lang="en-NL"/>
           </a:p>
@@ -593,7 +593,7 @@
           <a:p>
             <a:fld id="{803E3878-CEFB-8C45-A7D1-B2A6D544C41F}" type="datetimeFigureOut">
               <a:rPr lang="en-NL" smtClean="0"/>
-              <a:t>30/07/2021</a:t>
+              <a:t>11/09/2021</a:t>
             </a:fld>
             <a:endParaRPr lang="en-NL"/>
           </a:p>
@@ -763,7 +763,7 @@
           <a:p>
             <a:fld id="{803E3878-CEFB-8C45-A7D1-B2A6D544C41F}" type="datetimeFigureOut">
               <a:rPr lang="en-NL" smtClean="0"/>
-              <a:t>30/07/2021</a:t>
+              <a:t>11/09/2021</a:t>
             </a:fld>
             <a:endParaRPr lang="en-NL"/>
           </a:p>
@@ -1009,7 +1009,7 @@
           <a:p>
             <a:fld id="{803E3878-CEFB-8C45-A7D1-B2A6D544C41F}" type="datetimeFigureOut">
               <a:rPr lang="en-NL" smtClean="0"/>
-              <a:t>30/07/2021</a:t>
+              <a:t>11/09/2021</a:t>
             </a:fld>
             <a:endParaRPr lang="en-NL"/>
           </a:p>
@@ -1241,7 +1241,7 @@
           <a:p>
             <a:fld id="{803E3878-CEFB-8C45-A7D1-B2A6D544C41F}" type="datetimeFigureOut">
               <a:rPr lang="en-NL" smtClean="0"/>
-              <a:t>30/07/2021</a:t>
+              <a:t>11/09/2021</a:t>
             </a:fld>
             <a:endParaRPr lang="en-NL"/>
           </a:p>
@@ -1608,7 +1608,7 @@
           <a:p>
             <a:fld id="{803E3878-CEFB-8C45-A7D1-B2A6D544C41F}" type="datetimeFigureOut">
               <a:rPr lang="en-NL" smtClean="0"/>
-              <a:t>30/07/2021</a:t>
+              <a:t>11/09/2021</a:t>
             </a:fld>
             <a:endParaRPr lang="en-NL"/>
           </a:p>
@@ -1726,7 +1726,7 @@
           <a:p>
             <a:fld id="{803E3878-CEFB-8C45-A7D1-B2A6D544C41F}" type="datetimeFigureOut">
               <a:rPr lang="en-NL" smtClean="0"/>
-              <a:t>30/07/2021</a:t>
+              <a:t>11/09/2021</a:t>
             </a:fld>
             <a:endParaRPr lang="en-NL"/>
           </a:p>
@@ -1821,7 +1821,7 @@
           <a:p>
             <a:fld id="{803E3878-CEFB-8C45-A7D1-B2A6D544C41F}" type="datetimeFigureOut">
               <a:rPr lang="en-NL" smtClean="0"/>
-              <a:t>30/07/2021</a:t>
+              <a:t>11/09/2021</a:t>
             </a:fld>
             <a:endParaRPr lang="en-NL"/>
           </a:p>
@@ -2098,7 +2098,7 @@
           <a:p>
             <a:fld id="{803E3878-CEFB-8C45-A7D1-B2A6D544C41F}" type="datetimeFigureOut">
               <a:rPr lang="en-NL" smtClean="0"/>
-              <a:t>30/07/2021</a:t>
+              <a:t>11/09/2021</a:t>
             </a:fld>
             <a:endParaRPr lang="en-NL"/>
           </a:p>
@@ -2355,7 +2355,7 @@
           <a:p>
             <a:fld id="{803E3878-CEFB-8C45-A7D1-B2A6D544C41F}" type="datetimeFigureOut">
               <a:rPr lang="en-NL" smtClean="0"/>
-              <a:t>30/07/2021</a:t>
+              <a:t>11/09/2021</a:t>
             </a:fld>
             <a:endParaRPr lang="en-NL"/>
           </a:p>
@@ -2568,7 +2568,7 @@
           <a:p>
             <a:fld id="{803E3878-CEFB-8C45-A7D1-B2A6D544C41F}" type="datetimeFigureOut">
               <a:rPr lang="en-NL" smtClean="0"/>
-              <a:t>30/07/2021</a:t>
+              <a:t>11/09/2021</a:t>
             </a:fld>
             <a:endParaRPr lang="en-NL"/>
           </a:p>
@@ -3093,7 +3093,7 @@
               <a:r>
                 <a:rPr lang="en-NL" sz="900" b="1" dirty="0">
                   <a:solidFill>
-                    <a:srgbClr val="2BA02B"/>
+                    <a:srgbClr val="1E77B4"/>
                   </a:solidFill>
                   <a:latin typeface="Garamond" panose="02020404030301010803" pitchFamily="18" charset="0"/>
                 </a:rPr>
@@ -3573,7 +3573,7 @@
             </a:prstGeom>
             <a:ln w="38100">
               <a:solidFill>
-                <a:srgbClr val="2BA02B"/>
+                <a:srgbClr val="1E77B4"/>
               </a:solidFill>
               <a:tailEnd type="triangle"/>
             </a:ln>
@@ -3621,7 +3621,7 @@
             </a:prstGeom>
             <a:ln w="38100">
               <a:solidFill>
-                <a:srgbClr val="2BA02B"/>
+                <a:srgbClr val="1E77B4"/>
               </a:solidFill>
               <a:tailEnd type="triangle"/>
             </a:ln>
@@ -3669,7 +3669,7 @@
             </a:prstGeom>
             <a:ln w="38100">
               <a:solidFill>
-                <a:srgbClr val="1E77B4"/>
+                <a:srgbClr val="9467BD"/>
               </a:solidFill>
               <a:tailEnd type="triangle"/>
             </a:ln>
@@ -3715,7 +3715,7 @@
             </a:prstGeom>
             <a:ln w="38100">
               <a:solidFill>
-                <a:srgbClr val="9467BD"/>
+                <a:srgbClr val="2BA02B"/>
               </a:solidFill>
               <a:tailEnd type="triangle"/>
             </a:ln>
@@ -3966,7 +3966,7 @@
               <a:r>
                 <a:rPr lang="en-NL" sz="900" b="1" dirty="0">
                   <a:solidFill>
-                    <a:srgbClr val="2BA02B"/>
+                    <a:srgbClr val="1E77B4"/>
                   </a:solidFill>
                   <a:latin typeface="Garamond" panose="02020404030301010803" pitchFamily="18" charset="0"/>
                 </a:rPr>
@@ -4006,7 +4006,7 @@
               <a:r>
                 <a:rPr lang="en-NL" sz="900" b="1" dirty="0">
                   <a:solidFill>
-                    <a:srgbClr val="1E77B4"/>
+                    <a:srgbClr val="9467BD"/>
                   </a:solidFill>
                   <a:latin typeface="Garamond" panose="02020404030301010803" pitchFamily="18" charset="0"/>
                 </a:rPr>
@@ -4046,7 +4046,7 @@
               <a:r>
                 <a:rPr lang="en-NL" sz="900" b="1" dirty="0">
                   <a:solidFill>
-                    <a:srgbClr val="9467BD"/>
+                    <a:srgbClr val="2BA02B"/>
                   </a:solidFill>
                   <a:latin typeface="Garamond" panose="02020404030301010803" pitchFamily="18" charset="0"/>
                 </a:rPr>
@@ -4156,7 +4156,7 @@
               <a:avLst/>
             </a:prstGeom>
             <a:solidFill>
-              <a:srgbClr val="2BA02B"/>
+              <a:srgbClr val="1E77B4"/>
             </a:solidFill>
           </p:spPr>
           <p:txBody>
@@ -4196,7 +4196,7 @@
               <a:avLst/>
             </a:prstGeom>
             <a:solidFill>
-              <a:srgbClr val="1E77B4"/>
+              <a:srgbClr val="9467BD"/>
             </a:solidFill>
           </p:spPr>
           <p:txBody>
@@ -4236,7 +4236,7 @@
               <a:avLst/>
             </a:prstGeom>
             <a:solidFill>
-              <a:srgbClr val="9467BD"/>
+              <a:srgbClr val="2BA02B"/>
             </a:solidFill>
           </p:spPr>
           <p:txBody>
@@ -4356,7 +4356,7 @@
               <a:avLst/>
             </a:prstGeom>
             <a:solidFill>
-              <a:srgbClr val="2BA02B"/>
+              <a:srgbClr val="1E77B4"/>
             </a:solidFill>
           </p:spPr>
           <p:txBody>
@@ -4396,7 +4396,7 @@
               <a:avLst/>
             </a:prstGeom>
             <a:solidFill>
-              <a:srgbClr val="1E77B4"/>
+              <a:srgbClr val="9467BD"/>
             </a:solidFill>
           </p:spPr>
           <p:txBody>
@@ -4436,7 +4436,7 @@
               <a:avLst/>
             </a:prstGeom>
             <a:solidFill>
-              <a:srgbClr val="9467BD"/>
+              <a:srgbClr val="2BA02B"/>
             </a:solidFill>
           </p:spPr>
           <p:txBody>

</xml_diff>